<commit_message>
Cambios en fondos de página
</commit_message>
<xml_diff>
--- a/Plantillas fondos.pptx
+++ b/Plantillas fondos.pptx
@@ -249,7 +249,7 @@
           <a:p>
             <a:fld id="{B0D3817D-D50C-483D-9A81-FDDC3E2C2984}" type="datetimeFigureOut">
               <a:rPr lang="es-CO" smtClean="0"/>
-              <a:t>29/08/2021</a:t>
+              <a:t>31/08/2021</a:t>
             </a:fld>
             <a:endParaRPr lang="es-CO"/>
           </a:p>
@@ -419,7 +419,7 @@
           <a:p>
             <a:fld id="{B0D3817D-D50C-483D-9A81-FDDC3E2C2984}" type="datetimeFigureOut">
               <a:rPr lang="es-CO" smtClean="0"/>
-              <a:t>29/08/2021</a:t>
+              <a:t>31/08/2021</a:t>
             </a:fld>
             <a:endParaRPr lang="es-CO"/>
           </a:p>
@@ -599,7 +599,7 @@
           <a:p>
             <a:fld id="{B0D3817D-D50C-483D-9A81-FDDC3E2C2984}" type="datetimeFigureOut">
               <a:rPr lang="es-CO" smtClean="0"/>
-              <a:t>29/08/2021</a:t>
+              <a:t>31/08/2021</a:t>
             </a:fld>
             <a:endParaRPr lang="es-CO"/>
           </a:p>
@@ -769,7 +769,7 @@
           <a:p>
             <a:fld id="{B0D3817D-D50C-483D-9A81-FDDC3E2C2984}" type="datetimeFigureOut">
               <a:rPr lang="es-CO" smtClean="0"/>
-              <a:t>29/08/2021</a:t>
+              <a:t>31/08/2021</a:t>
             </a:fld>
             <a:endParaRPr lang="es-CO"/>
           </a:p>
@@ -1015,7 +1015,7 @@
           <a:p>
             <a:fld id="{B0D3817D-D50C-483D-9A81-FDDC3E2C2984}" type="datetimeFigureOut">
               <a:rPr lang="es-CO" smtClean="0"/>
-              <a:t>29/08/2021</a:t>
+              <a:t>31/08/2021</a:t>
             </a:fld>
             <a:endParaRPr lang="es-CO"/>
           </a:p>
@@ -1247,7 +1247,7 @@
           <a:p>
             <a:fld id="{B0D3817D-D50C-483D-9A81-FDDC3E2C2984}" type="datetimeFigureOut">
               <a:rPr lang="es-CO" smtClean="0"/>
-              <a:t>29/08/2021</a:t>
+              <a:t>31/08/2021</a:t>
             </a:fld>
             <a:endParaRPr lang="es-CO"/>
           </a:p>
@@ -1614,7 +1614,7 @@
           <a:p>
             <a:fld id="{B0D3817D-D50C-483D-9A81-FDDC3E2C2984}" type="datetimeFigureOut">
               <a:rPr lang="es-CO" smtClean="0"/>
-              <a:t>29/08/2021</a:t>
+              <a:t>31/08/2021</a:t>
             </a:fld>
             <a:endParaRPr lang="es-CO"/>
           </a:p>
@@ -1732,7 +1732,7 @@
           <a:p>
             <a:fld id="{B0D3817D-D50C-483D-9A81-FDDC3E2C2984}" type="datetimeFigureOut">
               <a:rPr lang="es-CO" smtClean="0"/>
-              <a:t>29/08/2021</a:t>
+              <a:t>31/08/2021</a:t>
             </a:fld>
             <a:endParaRPr lang="es-CO"/>
           </a:p>
@@ -1827,7 +1827,7 @@
           <a:p>
             <a:fld id="{B0D3817D-D50C-483D-9A81-FDDC3E2C2984}" type="datetimeFigureOut">
               <a:rPr lang="es-CO" smtClean="0"/>
-              <a:t>29/08/2021</a:t>
+              <a:t>31/08/2021</a:t>
             </a:fld>
             <a:endParaRPr lang="es-CO"/>
           </a:p>
@@ -2104,7 +2104,7 @@
           <a:p>
             <a:fld id="{B0D3817D-D50C-483D-9A81-FDDC3E2C2984}" type="datetimeFigureOut">
               <a:rPr lang="es-CO" smtClean="0"/>
-              <a:t>29/08/2021</a:t>
+              <a:t>31/08/2021</a:t>
             </a:fld>
             <a:endParaRPr lang="es-CO"/>
           </a:p>
@@ -2357,7 +2357,7 @@
           <a:p>
             <a:fld id="{B0D3817D-D50C-483D-9A81-FDDC3E2C2984}" type="datetimeFigureOut">
               <a:rPr lang="es-CO" smtClean="0"/>
-              <a:t>29/08/2021</a:t>
+              <a:t>31/08/2021</a:t>
             </a:fld>
             <a:endParaRPr lang="es-CO"/>
           </a:p>
@@ -2570,7 +2570,7 @@
           <a:p>
             <a:fld id="{B0D3817D-D50C-483D-9A81-FDDC3E2C2984}" type="datetimeFigureOut">
               <a:rPr lang="es-CO" smtClean="0"/>
-              <a:t>29/08/2021</a:t>
+              <a:t>31/08/2021</a:t>
             </a:fld>
             <a:endParaRPr lang="es-CO"/>
           </a:p>
@@ -3353,6 +3353,13 @@
   <p:clrMapOvr>
     <a:masterClrMapping/>
   </p:clrMapOvr>
+  <p:timing>
+    <p:tnLst>
+      <p:par>
+        <p:cTn id="1" dur="indefinite" restart="never" nodeType="tmRoot"/>
+      </p:par>
+    </p:tnLst>
+  </p:timing>
 </p:sld>
 </file>
 
@@ -3681,7 +3688,7 @@
         </p:nvSpPr>
         <p:spPr>
           <a:xfrm>
-            <a:off x="0" y="276897"/>
+            <a:off x="0" y="32196"/>
             <a:ext cx="1313647" cy="991673"/>
           </a:xfrm>
           <a:prstGeom prst="homePlate">
@@ -3963,6 +3970,14 @@
 <file path=ppt/slides/slide5.xml><?xml version="1.0" encoding="utf-8"?>
 <p:sld xmlns:a="http://schemas.openxmlformats.org/drawingml/2006/main" xmlns:r="http://schemas.openxmlformats.org/officeDocument/2006/relationships" xmlns:p="http://schemas.openxmlformats.org/presentationml/2006/main">
   <p:cSld>
+    <p:bg>
+      <p:bgPr>
+        <a:solidFill>
+          <a:schemeClr val="bg1"/>
+        </a:solidFill>
+        <a:effectLst/>
+      </p:bgPr>
+    </p:bg>
     <p:spTree>
       <p:nvGrpSpPr>
         <p:cNvPr id="1" name=""/>
@@ -4266,7 +4281,7 @@
         </p:nvSpPr>
         <p:spPr>
           <a:xfrm>
-            <a:off x="759854" y="57070"/>
+            <a:off x="759854" y="138958"/>
             <a:ext cx="1081826" cy="1135485"/>
           </a:xfrm>
           <a:prstGeom prst="diamond">

</xml_diff>